<commit_message>
Update with speaker notes
</commit_message>
<xml_diff>
--- a/2017_APACHECON_US/ConSchedAndSbSChangeCloud.pptx
+++ b/2017_APACHECON_US/ConSchedAndSbSChangeCloud.pptx
@@ -1283,26 +1283,52 @@
           <a:lstStyle/>
           <a:p>
             <a:r>
-              <a:rPr lang="en-US" dirty="0" smtClean="0"/>
-              <a:t>Not</a:t>
-            </a:r>
-            <a:r>
               <a:rPr lang="en-US" baseline="0" dirty="0" smtClean="0"/>
-              <a:t> only is ScaleIO a Software Defined Storage platform, but it’s also a Software-based Storage platform.</a:t>
-            </a:r>
-          </a:p>
-          <a:p>
+              <a:t>Meaning </a:t>
+            </a:r>
             <a:r>
               <a:rPr lang="en-US" baseline="0" dirty="0" smtClean="0"/>
-              <a:t>Meaning you can install this anywhere. On Linux, Windows, Virtualized environment like </a:t>
-            </a:r>
-            <a:r>
-              <a:rPr lang="en-US" baseline="0" dirty="0" err="1" smtClean="0"/>
-              <a:t>Vmware</a:t>
+              <a:t>you can install this </a:t>
             </a:r>
             <a:r>
               <a:rPr lang="en-US" baseline="0" dirty="0" smtClean="0"/>
-              <a:t>, in the Cloud.</a:t>
+              <a:t>anywhere.</a:t>
+            </a:r>
+          </a:p>
+          <a:p>
+            <a:r>
+              <a:rPr lang="en-US" baseline="0" dirty="0" smtClean="0"/>
+              <a:t>Elastic architecture </a:t>
+            </a:r>
+            <a:r>
+              <a:rPr lang="mr-IN" baseline="0" dirty="0" smtClean="0"/>
+              <a:t>–</a:t>
+            </a:r>
+            <a:r>
+              <a:rPr lang="en-US" baseline="0" dirty="0" smtClean="0"/>
+              <a:t> Add/remove nodes</a:t>
+            </a:r>
+            <a:r>
+              <a:rPr lang="mr-IN" baseline="0" dirty="0" smtClean="0"/>
+              <a:t>…</a:t>
+            </a:r>
+            <a:r>
+              <a:rPr lang="en-US" baseline="0" dirty="0" smtClean="0"/>
+              <a:t> automatically triggers a rebalance to keep your </a:t>
+            </a:r>
+            <a:r>
+              <a:rPr lang="en-US" baseline="0" smtClean="0"/>
+              <a:t>data protected.</a:t>
+            </a:r>
+            <a:endParaRPr lang="en-US" baseline="0" dirty="0" smtClean="0"/>
+          </a:p>
+          <a:p>
+            <a:endParaRPr lang="en-US" baseline="0" dirty="0" smtClean="0"/>
+          </a:p>
+          <a:p>
+            <a:r>
+              <a:rPr lang="en-US" baseline="0" dirty="0" smtClean="0"/>
+              <a:t>IMPORTANT: What ScaleIO brings to the table is it takes Direct Attached Storage and transforms that into a Global Accessible Storage Pool across your nodes.</a:t>
             </a:r>
             <a:endParaRPr lang="en-US" dirty="0"/>
           </a:p>
@@ -2873,15 +2899,7 @@
             </a:r>
             <a:r>
               <a:rPr lang="en-US" baseline="0" dirty="0" smtClean="0"/>
-              <a:t> this allows me know how </a:t>
-            </a:r>
-            <a:r>
-              <a:rPr lang="en-US" baseline="0" dirty="0" smtClean="0"/>
-              <a:t>quickly </a:t>
-            </a:r>
-            <a:r>
-              <a:rPr lang="en-US" baseline="0" dirty="0" smtClean="0"/>
-              <a:t>I can scale my application</a:t>
+              <a:t> this allows me know how quickly I can scale my application</a:t>
             </a:r>
           </a:p>
         </p:txBody>
@@ -3429,6 +3447,19 @@
             <a:r>
               <a:rPr lang="en-US" baseline="0" dirty="0" smtClean="0"/>
               <a:t>Allows you to override the behavior of how an application is placed in your cluster.</a:t>
+            </a:r>
+          </a:p>
+          <a:p>
+            <a:endParaRPr lang="en-US" baseline="0" dirty="0" smtClean="0"/>
+          </a:p>
+          <a:p>
+            <a:r>
+              <a:rPr lang="en-US" baseline="0" dirty="0" smtClean="0"/>
+              <a:t>Tightly couple in the sense you can do specialized things. </a:t>
+            </a:r>
+            <a:r>
+              <a:rPr lang="en-US" baseline="0" smtClean="0"/>
+              <a:t>For example, monitor the Application’s health.</a:t>
             </a:r>
             <a:endParaRPr lang="en-US" dirty="0"/>
           </a:p>
@@ -7889,7 +7920,7 @@
                   <a:schemeClr val="bg1"/>
                 </a:buClr>
               </a:pPr>
-              <a:t>5/13/17</a:t>
+              <a:t>5/17/17</a:t>
             </a:fld>
             <a:endParaRPr lang="en-US" sz="900" dirty="0" smtClean="0">
               <a:solidFill>
@@ -7963,7 +7994,7 @@
                   <a:schemeClr val="bg1"/>
                 </a:buClr>
               </a:pPr>
-              <a:t>5/13/17</a:t>
+              <a:t>5/17/17</a:t>
             </a:fld>
             <a:endParaRPr lang="en-US" sz="900" dirty="0" smtClean="0">
               <a:solidFill>
@@ -10251,9 +10282,10 @@
           </a:p>
           <a:p>
             <a:r>
-              <a:rPr lang="en-US" dirty="0"/>
-              <a:t>Multiple Frameworks run within the cluster</a:t>
-            </a:r>
+              <a:rPr lang="en-US" dirty="0" smtClean="0"/>
+              <a:t>Framework tightly coupled to Application</a:t>
+            </a:r>
+            <a:endParaRPr lang="en-US" dirty="0"/>
           </a:p>
           <a:p>
             <a:pPr marL="0" indent="0">
@@ -11090,7 +11122,7 @@
           <a:p>
             <a:r>
               <a:rPr lang="en-US" dirty="0" smtClean="0"/>
-              <a:t>Framework installs and configures Storage Platform on all Scheduler’s compute nodes</a:t>
+              <a:t>Framework installs and configures Storage Platform on all Mesos Agent nodes</a:t>
             </a:r>
           </a:p>
         </p:txBody>
@@ -11605,19 +11637,7 @@
           <a:p>
             <a:r>
               <a:rPr lang="en-US" smtClean="0"/>
-              <a:t>Top </a:t>
-            </a:r>
-            <a:r>
-              <a:rPr lang="en-US" smtClean="0"/>
-              <a:t>10 </a:t>
-            </a:r>
-            <a:r>
-              <a:rPr lang="en-US" smtClean="0"/>
-              <a:t>of </a:t>
-            </a:r>
-            <a:r>
-              <a:rPr lang="en-US" smtClean="0"/>
-              <a:t>20 Apps </a:t>
+              <a:t>Top 10 of 20 Apps </a:t>
             </a:r>
             <a:r>
               <a:rPr lang="en-US" dirty="0" smtClean="0"/>
@@ -13078,8 +13098,13 @@
           <a:p>
             <a:r>
               <a:rPr lang="en-US" dirty="0" smtClean="0"/>
-              <a:t>Cloud is perfect to enable DevOps</a:t>
-            </a:r>
+              <a:t>DevOps and </a:t>
+            </a:r>
+            <a:r>
+              <a:rPr lang="en-US" smtClean="0"/>
+              <a:t>the Cloud go hand in hand</a:t>
+            </a:r>
+            <a:endParaRPr lang="en-US" dirty="0" smtClean="0"/>
           </a:p>
           <a:p>
             <a:r>

</xml_diff>